<commit_message>
[AuVAReS] updated functions, added images to display infos when initializing drone
</commit_message>
<xml_diff>
--- a/docs/AuVAReS/Landepad Logo.pptx
+++ b/docs/AuVAReS/Landepad Logo.pptx
@@ -6,6 +6,8 @@
   </p:sldMasterIdLst>
   <p:sldIdLst>
     <p:sldId id="257" r:id="rId2"/>
+    <p:sldId id="258" r:id="rId3"/>
+    <p:sldId id="259" r:id="rId4"/>
   </p:sldIdLst>
   <p:sldSz cx="12801600" cy="9601200" type="A3"/>
   <p:notesSz cx="6858000" cy="9144000"/>
@@ -677,7 +679,7 @@
           <a:p>
             <a:fld id="{59B793EE-7846-4521-80BC-DC61B8FAA7DF}" type="datetimeFigureOut">
               <a:rPr lang="de-DE" smtClean="0"/>
-              <a:t>17.05.2024</a:t>
+              <a:t>25.05.24</a:t>
             </a:fld>
             <a:endParaRPr lang="de-DE"/>
           </a:p>
@@ -847,7 +849,7 @@
           <a:p>
             <a:fld id="{59B793EE-7846-4521-80BC-DC61B8FAA7DF}" type="datetimeFigureOut">
               <a:rPr lang="de-DE" smtClean="0"/>
-              <a:t>17.05.2024</a:t>
+              <a:t>25.05.24</a:t>
             </a:fld>
             <a:endParaRPr lang="de-DE"/>
           </a:p>
@@ -1027,7 +1029,7 @@
           <a:p>
             <a:fld id="{59B793EE-7846-4521-80BC-DC61B8FAA7DF}" type="datetimeFigureOut">
               <a:rPr lang="de-DE" smtClean="0"/>
-              <a:t>17.05.2024</a:t>
+              <a:t>25.05.24</a:t>
             </a:fld>
             <a:endParaRPr lang="de-DE"/>
           </a:p>
@@ -1197,7 +1199,7 @@
           <a:p>
             <a:fld id="{59B793EE-7846-4521-80BC-DC61B8FAA7DF}" type="datetimeFigureOut">
               <a:rPr lang="de-DE" smtClean="0"/>
-              <a:t>17.05.2024</a:t>
+              <a:t>25.05.24</a:t>
             </a:fld>
             <a:endParaRPr lang="de-DE"/>
           </a:p>
@@ -1443,7 +1445,7 @@
           <a:p>
             <a:fld id="{59B793EE-7846-4521-80BC-DC61B8FAA7DF}" type="datetimeFigureOut">
               <a:rPr lang="de-DE" smtClean="0"/>
-              <a:t>17.05.2024</a:t>
+              <a:t>25.05.24</a:t>
             </a:fld>
             <a:endParaRPr lang="de-DE"/>
           </a:p>
@@ -1675,7 +1677,7 @@
           <a:p>
             <a:fld id="{59B793EE-7846-4521-80BC-DC61B8FAA7DF}" type="datetimeFigureOut">
               <a:rPr lang="de-DE" smtClean="0"/>
-              <a:t>17.05.2024</a:t>
+              <a:t>25.05.24</a:t>
             </a:fld>
             <a:endParaRPr lang="de-DE"/>
           </a:p>
@@ -2042,7 +2044,7 @@
           <a:p>
             <a:fld id="{59B793EE-7846-4521-80BC-DC61B8FAA7DF}" type="datetimeFigureOut">
               <a:rPr lang="de-DE" smtClean="0"/>
-              <a:t>17.05.2024</a:t>
+              <a:t>25.05.24</a:t>
             </a:fld>
             <a:endParaRPr lang="de-DE"/>
           </a:p>
@@ -2160,7 +2162,7 @@
           <a:p>
             <a:fld id="{59B793EE-7846-4521-80BC-DC61B8FAA7DF}" type="datetimeFigureOut">
               <a:rPr lang="de-DE" smtClean="0"/>
-              <a:t>17.05.2024</a:t>
+              <a:t>25.05.24</a:t>
             </a:fld>
             <a:endParaRPr lang="de-DE"/>
           </a:p>
@@ -2255,7 +2257,7 @@
           <a:p>
             <a:fld id="{59B793EE-7846-4521-80BC-DC61B8FAA7DF}" type="datetimeFigureOut">
               <a:rPr lang="de-DE" smtClean="0"/>
-              <a:t>17.05.2024</a:t>
+              <a:t>25.05.24</a:t>
             </a:fld>
             <a:endParaRPr lang="de-DE"/>
           </a:p>
@@ -2532,7 +2534,7 @@
           <a:p>
             <a:fld id="{59B793EE-7846-4521-80BC-DC61B8FAA7DF}" type="datetimeFigureOut">
               <a:rPr lang="de-DE" smtClean="0"/>
-              <a:t>17.05.2024</a:t>
+              <a:t>25.05.24</a:t>
             </a:fld>
             <a:endParaRPr lang="de-DE"/>
           </a:p>
@@ -2789,7 +2791,7 @@
           <a:p>
             <a:fld id="{59B793EE-7846-4521-80BC-DC61B8FAA7DF}" type="datetimeFigureOut">
               <a:rPr lang="de-DE" smtClean="0"/>
-              <a:t>17.05.2024</a:t>
+              <a:t>25.05.24</a:t>
             </a:fld>
             <a:endParaRPr lang="de-DE"/>
           </a:p>
@@ -3002,7 +3004,7 @@
           <a:p>
             <a:fld id="{59B793EE-7846-4521-80BC-DC61B8FAA7DF}" type="datetimeFigureOut">
               <a:rPr lang="de-DE" smtClean="0"/>
-              <a:t>17.05.2024</a:t>
+              <a:t>25.05.24</a:t>
             </a:fld>
             <a:endParaRPr lang="de-DE"/>
           </a:p>
@@ -4688,6 +4690,274 @@
 </p:sld>
 </file>
 
+<file path=ppt/slides/slide2.xml><?xml version="1.0" encoding="utf-8"?>
+<p:sld xmlns:a="http://schemas.openxmlformats.org/drawingml/2006/main" xmlns:r="http://schemas.openxmlformats.org/officeDocument/2006/relationships" xmlns:p="http://schemas.openxmlformats.org/presentationml/2006/main">
+  <p:cSld>
+    <p:spTree>
+      <p:nvGrpSpPr>
+        <p:cNvPr id="1" name=""/>
+        <p:cNvGrpSpPr/>
+        <p:nvPr/>
+      </p:nvGrpSpPr>
+      <p:grpSpPr>
+        <a:xfrm>
+          <a:off x="0" y="0"/>
+          <a:ext cx="0" cy="0"/>
+          <a:chOff x="0" y="0"/>
+          <a:chExt cx="0" cy="0"/>
+        </a:xfrm>
+      </p:grpSpPr>
+      <p:pic>
+        <p:nvPicPr>
+          <p:cNvPr id="3" name="Grafik 2" descr="Ein Bild, das Screenshot, Grafiken, Grafikdesign, Design enthält.&#10;&#10;Automatisch generierte Beschreibung">
+            <a:extLst>
+              <a:ext uri="{FF2B5EF4-FFF2-40B4-BE49-F238E27FC236}">
+                <a16:creationId xmlns:a16="http://schemas.microsoft.com/office/drawing/2014/main" id="{FCC5B275-35DE-9BB5-933E-F9E478A44519}"/>
+              </a:ext>
+            </a:extLst>
+          </p:cNvPr>
+          <p:cNvPicPr>
+            <a:picLocks noChangeAspect="1"/>
+          </p:cNvPicPr>
+          <p:nvPr/>
+        </p:nvPicPr>
+        <p:blipFill rotWithShape="1">
+          <a:blip r:embed="rId2">
+            <a:extLst>
+              <a:ext uri="{28A0092B-C50C-407E-A947-70E740481C1C}">
+                <a14:useLocalDpi xmlns:a14="http://schemas.microsoft.com/office/drawing/2010/main" val="0"/>
+              </a:ext>
+            </a:extLst>
+          </a:blip>
+          <a:srcRect r="63846"/>
+          <a:stretch/>
+        </p:blipFill>
+        <p:spPr>
+          <a:xfrm>
+            <a:off x="109078" y="6558620"/>
+            <a:ext cx="2698741" cy="2842735"/>
+          </a:xfrm>
+          <a:prstGeom prst="rect">
+            <a:avLst/>
+          </a:prstGeom>
+        </p:spPr>
+      </p:pic>
+      <p:sp>
+        <p:nvSpPr>
+          <p:cNvPr id="2" name="Textfeld 1">
+            <a:extLst>
+              <a:ext uri="{FF2B5EF4-FFF2-40B4-BE49-F238E27FC236}">
+                <a16:creationId xmlns:a16="http://schemas.microsoft.com/office/drawing/2014/main" id="{FF59D1A4-22B9-5229-E90F-8090C756362F}"/>
+              </a:ext>
+            </a:extLst>
+          </p:cNvPr>
+          <p:cNvSpPr txBox="1"/>
+          <p:nvPr/>
+        </p:nvSpPr>
+        <p:spPr>
+          <a:xfrm>
+            <a:off x="2173575" y="3080745"/>
+            <a:ext cx="9069049" cy="3477875"/>
+          </a:xfrm>
+          <a:prstGeom prst="rect">
+            <a:avLst/>
+          </a:prstGeom>
+          <a:noFill/>
+        </p:spPr>
+        <p:txBody>
+          <a:bodyPr wrap="square" rtlCol="0">
+            <a:spAutoFit/>
+          </a:bodyPr>
+          <a:lstStyle/>
+          <a:p>
+            <a:pPr algn="ctr"/>
+            <a:r>
+              <a:rPr lang="de-DE" sz="4400" b="1" dirty="0"/>
+              <a:t>Drohnen-Temperatur zu hoch!</a:t>
+            </a:r>
+          </a:p>
+          <a:p>
+            <a:pPr algn="ctr"/>
+            <a:r>
+              <a:rPr lang="de-DE" sz="4400" b="1" dirty="0"/>
+              <a:t>Verkürzte Spieldauer mit </a:t>
+            </a:r>
+            <a:r>
+              <a:rPr lang="de-DE" sz="4400" b="1" dirty="0" err="1"/>
+              <a:t>AuVAReS</a:t>
+            </a:r>
+            <a:r>
+              <a:rPr lang="de-DE" sz="4400" b="1" dirty="0"/>
+              <a:t>.</a:t>
+            </a:r>
+          </a:p>
+          <a:p>
+            <a:endParaRPr lang="de-DE" sz="4400" b="1" dirty="0"/>
+          </a:p>
+          <a:p>
+            <a:pPr algn="ctr"/>
+            <a:r>
+              <a:rPr lang="de-DE" sz="4400" b="1" dirty="0"/>
+              <a:t>Spiel kann ohne </a:t>
+            </a:r>
+            <a:r>
+              <a:rPr lang="de-DE" sz="4400" b="1" dirty="0" err="1"/>
+              <a:t>AuVAReS</a:t>
+            </a:r>
+            <a:r>
+              <a:rPr lang="de-DE" sz="4400" b="1" dirty="0"/>
+              <a:t> fortgesetzt werden.</a:t>
+            </a:r>
+          </a:p>
+        </p:txBody>
+      </p:sp>
+    </p:spTree>
+    <p:extLst>
+      <p:ext uri="{BB962C8B-B14F-4D97-AF65-F5344CB8AC3E}">
+        <p14:creationId xmlns:p14="http://schemas.microsoft.com/office/powerpoint/2010/main" val="3833372169"/>
+      </p:ext>
+    </p:extLst>
+  </p:cSld>
+  <p:clrMapOvr>
+    <a:masterClrMapping/>
+  </p:clrMapOvr>
+</p:sld>
+</file>
+
+<file path=ppt/slides/slide3.xml><?xml version="1.0" encoding="utf-8"?>
+<p:sld xmlns:a="http://schemas.openxmlformats.org/drawingml/2006/main" xmlns:r="http://schemas.openxmlformats.org/officeDocument/2006/relationships" xmlns:p="http://schemas.openxmlformats.org/presentationml/2006/main">
+  <p:cSld>
+    <p:spTree>
+      <p:nvGrpSpPr>
+        <p:cNvPr id="1" name=""/>
+        <p:cNvGrpSpPr/>
+        <p:nvPr/>
+      </p:nvGrpSpPr>
+      <p:grpSpPr>
+        <a:xfrm>
+          <a:off x="0" y="0"/>
+          <a:ext cx="0" cy="0"/>
+          <a:chOff x="0" y="0"/>
+          <a:chExt cx="0" cy="0"/>
+        </a:xfrm>
+      </p:grpSpPr>
+      <p:pic>
+        <p:nvPicPr>
+          <p:cNvPr id="3" name="Grafik 2" descr="Ein Bild, das Screenshot, Grafiken, Grafikdesign, Design enthält.&#10;&#10;Automatisch generierte Beschreibung">
+            <a:extLst>
+              <a:ext uri="{FF2B5EF4-FFF2-40B4-BE49-F238E27FC236}">
+                <a16:creationId xmlns:a16="http://schemas.microsoft.com/office/drawing/2014/main" id="{FCC5B275-35DE-9BB5-933E-F9E478A44519}"/>
+              </a:ext>
+            </a:extLst>
+          </p:cNvPr>
+          <p:cNvPicPr>
+            <a:picLocks noChangeAspect="1"/>
+          </p:cNvPicPr>
+          <p:nvPr/>
+        </p:nvPicPr>
+        <p:blipFill rotWithShape="1">
+          <a:blip r:embed="rId2">
+            <a:extLst>
+              <a:ext uri="{28A0092B-C50C-407E-A947-70E740481C1C}">
+                <a14:useLocalDpi xmlns:a14="http://schemas.microsoft.com/office/drawing/2010/main" val="0"/>
+              </a:ext>
+            </a:extLst>
+          </a:blip>
+          <a:srcRect r="63846"/>
+          <a:stretch/>
+        </p:blipFill>
+        <p:spPr>
+          <a:xfrm>
+            <a:off x="109078" y="6558620"/>
+            <a:ext cx="2698741" cy="2842735"/>
+          </a:xfrm>
+          <a:prstGeom prst="rect">
+            <a:avLst/>
+          </a:prstGeom>
+        </p:spPr>
+      </p:pic>
+      <p:sp>
+        <p:nvSpPr>
+          <p:cNvPr id="2" name="Textfeld 1">
+            <a:extLst>
+              <a:ext uri="{FF2B5EF4-FFF2-40B4-BE49-F238E27FC236}">
+                <a16:creationId xmlns:a16="http://schemas.microsoft.com/office/drawing/2014/main" id="{FF59D1A4-22B9-5229-E90F-8090C756362F}"/>
+              </a:ext>
+            </a:extLst>
+          </p:cNvPr>
+          <p:cNvSpPr txBox="1"/>
+          <p:nvPr/>
+        </p:nvSpPr>
+        <p:spPr>
+          <a:xfrm>
+            <a:off x="2173575" y="3080745"/>
+            <a:ext cx="9069049" cy="3477875"/>
+          </a:xfrm>
+          <a:prstGeom prst="rect">
+            <a:avLst/>
+          </a:prstGeom>
+          <a:noFill/>
+        </p:spPr>
+        <p:txBody>
+          <a:bodyPr wrap="square" rtlCol="0">
+            <a:spAutoFit/>
+          </a:bodyPr>
+          <a:lstStyle/>
+          <a:p>
+            <a:pPr algn="ctr"/>
+            <a:r>
+              <a:rPr lang="de-DE" sz="4400" b="1" dirty="0"/>
+              <a:t>Drohnen-Akku zu schwach!</a:t>
+            </a:r>
+          </a:p>
+          <a:p>
+            <a:pPr algn="ctr"/>
+            <a:r>
+              <a:rPr lang="de-DE" sz="4400" b="1" dirty="0"/>
+              <a:t>Verkürzte Spieldauer mit </a:t>
+            </a:r>
+            <a:r>
+              <a:rPr lang="de-DE" sz="4400" b="1" dirty="0" err="1"/>
+              <a:t>AuVAReS</a:t>
+            </a:r>
+            <a:r>
+              <a:rPr lang="de-DE" sz="4400" b="1" dirty="0"/>
+              <a:t>.</a:t>
+            </a:r>
+          </a:p>
+          <a:p>
+            <a:endParaRPr lang="de-DE" sz="4400" b="1" dirty="0"/>
+          </a:p>
+          <a:p>
+            <a:pPr algn="ctr"/>
+            <a:r>
+              <a:rPr lang="de-DE" sz="4400" b="1" dirty="0"/>
+              <a:t>Spiel kann ohne </a:t>
+            </a:r>
+            <a:r>
+              <a:rPr lang="de-DE" sz="4400" b="1" dirty="0" err="1"/>
+              <a:t>AuVAReS</a:t>
+            </a:r>
+            <a:r>
+              <a:rPr lang="de-DE" sz="4400" b="1" dirty="0"/>
+              <a:t> fortgesetzt werden.</a:t>
+            </a:r>
+          </a:p>
+        </p:txBody>
+      </p:sp>
+    </p:spTree>
+    <p:extLst>
+      <p:ext uri="{BB962C8B-B14F-4D97-AF65-F5344CB8AC3E}">
+        <p14:creationId xmlns:p14="http://schemas.microsoft.com/office/powerpoint/2010/main" val="209594731"/>
+      </p:ext>
+    </p:extLst>
+  </p:cSld>
+  <p:clrMapOvr>
+    <a:masterClrMapping/>
+  </p:clrMapOvr>
+</p:sld>
+</file>
+
 <file path=ppt/theme/theme1.xml><?xml version="1.0" encoding="utf-8"?>
 <a:theme xmlns:a="http://schemas.openxmlformats.org/drawingml/2006/main" name="Office">
   <a:themeElements>

</xml_diff>